<commit_message>
New Field in Tracks Table
Added the custom URL field in the tracks database table for when data is
being created. Also made slight changes to powerpoint
</commit_message>
<xml_diff>
--- a/SongAtlasPresentation.pptx
+++ b/SongAtlasPresentation.pptx
@@ -8,6 +8,8 @@
     <p:sldId id="256" r:id="rId2"/>
     <p:sldId id="257" r:id="rId3"/>
     <p:sldId id="258" r:id="rId4"/>
+    <p:sldId id="259" r:id="rId5"/>
+    <p:sldId id="260" r:id="rId6"/>
   </p:sldIdLst>
   <p:sldSz cx="12192000" cy="6858000"/>
   <p:notesSz cx="6858000" cy="9144000"/>
@@ -106,6 +108,11 @@
       </a:defRPr>
     </a:lvl9pPr>
   </p:defaultTextStyle>
+  <p:extLst>
+    <p:ext uri="{EFAFB233-063F-42B5-8137-9DF3F51BA10A}">
+      <p15:sldGuideLst xmlns:p15="http://schemas.microsoft.com/office/powerpoint/2012/main"/>
+    </p:ext>
+  </p:extLst>
 </p:presentation>
 </file>
 
@@ -6317,28 +6324,13 @@
                   </a:schemeClr>
                 </a:solidFill>
               </a:rPr>
-              <a:t>, and Last.fm</a:t>
+              <a:t>, and Last.fm.</a:t>
             </a:r>
           </a:p>
           <a:p>
             <a:r>
               <a:rPr lang="en-US" dirty="0" smtClean="0"/>
-              <a:t>We also are including a separate table for </a:t>
-            </a:r>
-            <a:r>
-              <a:rPr lang="en-US" dirty="0" smtClean="0">
-                <a:solidFill>
-                  <a:schemeClr val="accent2">
-                    <a:lumMod val="60000"/>
-                    <a:lumOff val="40000"/>
-                  </a:schemeClr>
-                </a:solidFill>
-              </a:rPr>
-              <a:t>User Submitted</a:t>
-            </a:r>
-            <a:r>
-              <a:rPr lang="en-US" dirty="0" smtClean="0"/>
-              <a:t> music. The purpose of this is to allow content to be added from sources that we currently using.</a:t>
+              <a:t>For editing the data, it’s required through an admin page in order to make sure no extraneous data is created or deleted.</a:t>
             </a:r>
             <a:endParaRPr lang="en-US" dirty="0"/>
           </a:p>
@@ -6420,6 +6412,164 @@
     <p:extLst>
       <p:ext uri="{BB962C8B-B14F-4D97-AF65-F5344CB8AC3E}">
         <p14:creationId xmlns:p14="http://schemas.microsoft.com/office/powerpoint/2010/main" val="3385249708"/>
+      </p:ext>
+    </p:extLst>
+  </p:cSld>
+  <p:clrMapOvr>
+    <a:masterClrMapping/>
+  </p:clrMapOvr>
+</p:sld>
+</file>
+
+<file path=ppt/slides/slide4.xml><?xml version="1.0" encoding="utf-8"?>
+<p:sld xmlns:a="http://schemas.openxmlformats.org/drawingml/2006/main" xmlns:r="http://schemas.openxmlformats.org/officeDocument/2006/relationships" xmlns:p="http://schemas.openxmlformats.org/presentationml/2006/main">
+  <p:cSld>
+    <p:spTree>
+      <p:nvGrpSpPr>
+        <p:cNvPr id="1" name=""/>
+        <p:cNvGrpSpPr/>
+        <p:nvPr/>
+      </p:nvGrpSpPr>
+      <p:grpSpPr>
+        <a:xfrm>
+          <a:off x="0" y="0"/>
+          <a:ext cx="0" cy="0"/>
+          <a:chOff x="0" y="0"/>
+          <a:chExt cx="0" cy="0"/>
+        </a:xfrm>
+      </p:grpSpPr>
+      <p:sp>
+        <p:nvSpPr>
+          <p:cNvPr id="2" name="Title 1"/>
+          <p:cNvSpPr>
+            <a:spLocks noGrp="1"/>
+          </p:cNvSpPr>
+          <p:nvPr>
+            <p:ph type="title"/>
+          </p:nvPr>
+        </p:nvSpPr>
+        <p:spPr/>
+        <p:txBody>
+          <a:bodyPr/>
+          <a:lstStyle/>
+          <a:p>
+            <a:r>
+              <a:rPr lang="en-US" dirty="0" smtClean="0"/>
+              <a:t>Database Architecture/EER Diagram</a:t>
+            </a:r>
+            <a:br>
+              <a:rPr lang="en-US" dirty="0" smtClean="0"/>
+            </a:br>
+            <a:endParaRPr lang="en-US" dirty="0"/>
+          </a:p>
+        </p:txBody>
+      </p:sp>
+      <p:pic>
+        <p:nvPicPr>
+          <p:cNvPr id="4" name="Content Placeholder 3"/>
+          <p:cNvPicPr>
+            <a:picLocks noGrp="1" noChangeAspect="1"/>
+          </p:cNvPicPr>
+          <p:nvPr>
+            <p:ph idx="1"/>
+          </p:nvPr>
+        </p:nvPicPr>
+        <p:blipFill>
+          <a:blip r:embed="rId2"/>
+          <a:stretch>
+            <a:fillRect/>
+          </a:stretch>
+        </p:blipFill>
+        <p:spPr>
+          <a:xfrm>
+            <a:off x="2684306" y="1853248"/>
+            <a:ext cx="6156467" cy="4581075"/>
+          </a:xfrm>
+          <a:prstGeom prst="rect">
+            <a:avLst/>
+          </a:prstGeom>
+        </p:spPr>
+      </p:pic>
+    </p:spTree>
+    <p:extLst>
+      <p:ext uri="{BB962C8B-B14F-4D97-AF65-F5344CB8AC3E}">
+        <p14:creationId xmlns:p14="http://schemas.microsoft.com/office/powerpoint/2010/main" val="2417528985"/>
+      </p:ext>
+    </p:extLst>
+  </p:cSld>
+  <p:clrMapOvr>
+    <a:masterClrMapping/>
+  </p:clrMapOvr>
+</p:sld>
+</file>
+
+<file path=ppt/slides/slide5.xml><?xml version="1.0" encoding="utf-8"?>
+<p:sld xmlns:a="http://schemas.openxmlformats.org/drawingml/2006/main" xmlns:r="http://schemas.openxmlformats.org/officeDocument/2006/relationships" xmlns:p="http://schemas.openxmlformats.org/presentationml/2006/main">
+  <p:cSld>
+    <p:spTree>
+      <p:nvGrpSpPr>
+        <p:cNvPr id="1" name=""/>
+        <p:cNvGrpSpPr/>
+        <p:nvPr/>
+      </p:nvGrpSpPr>
+      <p:grpSpPr>
+        <a:xfrm>
+          <a:off x="0" y="0"/>
+          <a:ext cx="0" cy="0"/>
+          <a:chOff x="0" y="0"/>
+          <a:chExt cx="0" cy="0"/>
+        </a:xfrm>
+      </p:grpSpPr>
+      <p:sp>
+        <p:nvSpPr>
+          <p:cNvPr id="4" name="Title 3"/>
+          <p:cNvSpPr>
+            <a:spLocks noGrp="1"/>
+          </p:cNvSpPr>
+          <p:nvPr>
+            <p:ph type="title"/>
+          </p:nvPr>
+        </p:nvSpPr>
+        <p:spPr/>
+        <p:txBody>
+          <a:bodyPr/>
+          <a:lstStyle/>
+          <a:p>
+            <a:r>
+              <a:rPr lang="en-US" dirty="0" smtClean="0"/>
+              <a:t>Short Demonstration</a:t>
+            </a:r>
+            <a:endParaRPr lang="en-US" dirty="0"/>
+          </a:p>
+        </p:txBody>
+      </p:sp>
+      <p:sp>
+        <p:nvSpPr>
+          <p:cNvPr id="5" name="Text Placeholder 4"/>
+          <p:cNvSpPr>
+            <a:spLocks noGrp="1"/>
+          </p:cNvSpPr>
+          <p:nvPr>
+            <p:ph type="body" sz="half" idx="2"/>
+          </p:nvPr>
+        </p:nvSpPr>
+        <p:spPr/>
+        <p:txBody>
+          <a:bodyPr/>
+          <a:lstStyle/>
+          <a:p>
+            <a:r>
+              <a:rPr lang="en-US" dirty="0" smtClean="0"/>
+              <a:t>Thank you!</a:t>
+            </a:r>
+            <a:endParaRPr lang="en-US" dirty="0"/>
+          </a:p>
+        </p:txBody>
+      </p:sp>
+    </p:spTree>
+    <p:extLst>
+      <p:ext uri="{BB962C8B-B14F-4D97-AF65-F5344CB8AC3E}">
+        <p14:creationId xmlns:p14="http://schemas.microsoft.com/office/powerpoint/2010/main" val="3651582892"/>
       </p:ext>
     </p:extLst>
   </p:cSld>

</xml_diff>

<commit_message>
Original Presentation was somehow partially deleted; Revised and finished
</commit_message>
<xml_diff>
--- a/SongAtlasPresentation.pptx
+++ b/SongAtlasPresentation.pptx
@@ -8,6 +8,8 @@
     <p:sldId id="256" r:id="rId2"/>
     <p:sldId id="257" r:id="rId3"/>
     <p:sldId id="258" r:id="rId4"/>
+    <p:sldId id="259" r:id="rId5"/>
+    <p:sldId id="260" r:id="rId6"/>
   </p:sldIdLst>
   <p:sldSz cx="12192000" cy="6858000"/>
   <p:notesSz cx="6858000" cy="9144000"/>
@@ -106,6 +108,24 @@
       </a:defRPr>
     </a:lvl9pPr>
   </p:defaultTextStyle>
+  <p:extLst>
+    <p:ext uri="{521415D9-36F7-43E2-AB2F-B90AF26B5E84}">
+      <p14:sectionLst xmlns:p14="http://schemas.microsoft.com/office/powerpoint/2010/main">
+        <p14:section name="Default Section" id="{7F80170A-47F1-4148-BD6C-BD68FEC34AED}">
+          <p14:sldIdLst>
+            <p14:sldId id="256"/>
+            <p14:sldId id="257"/>
+            <p14:sldId id="258"/>
+            <p14:sldId id="259"/>
+            <p14:sldId id="260"/>
+          </p14:sldIdLst>
+        </p14:section>
+      </p14:sectionLst>
+    </p:ext>
+    <p:ext uri="{EFAFB233-063F-42B5-8137-9DF3F51BA10A}">
+      <p15:sldGuideLst xmlns:p15="http://schemas.microsoft.com/office/powerpoint/2012/main"/>
+    </p:ext>
+  </p:extLst>
 </p:presentation>
 </file>
 
@@ -295,7 +315,7 @@
           <a:p>
             <a:fld id="{4AAD347D-5ACD-4C99-B74B-A9C85AD731AF}" type="datetimeFigureOut">
               <a:rPr lang="en-US" dirty="0"/>
-              <a:t>4/11/2016</a:t>
+              <a:t>4/13/2016</a:t>
             </a:fld>
             <a:endParaRPr lang="en-US" dirty="0"/>
           </a:p>
@@ -565,7 +585,7 @@
           <a:p>
             <a:fld id="{4509A250-FF31-4206-8172-F9D3106AACB1}" type="datetimeFigureOut">
               <a:rPr lang="en-US" dirty="0"/>
-              <a:t>4/11/2016</a:t>
+              <a:t>4/13/2016</a:t>
             </a:fld>
             <a:endParaRPr lang="en-US" dirty="0"/>
           </a:p>
@@ -754,7 +774,7 @@
           <a:p>
             <a:fld id="{4509A250-FF31-4206-8172-F9D3106AACB1}" type="datetimeFigureOut">
               <a:rPr lang="en-US" dirty="0"/>
-              <a:t>4/11/2016</a:t>
+              <a:t>4/13/2016</a:t>
             </a:fld>
             <a:endParaRPr lang="en-US" dirty="0"/>
           </a:p>
@@ -1022,7 +1042,7 @@
           <a:p>
             <a:fld id="{4509A250-FF31-4206-8172-F9D3106AACB1}" type="datetimeFigureOut">
               <a:rPr lang="en-US" dirty="0"/>
-              <a:t>4/11/2016</a:t>
+              <a:t>4/13/2016</a:t>
             </a:fld>
             <a:endParaRPr lang="en-US" dirty="0"/>
           </a:p>
@@ -1358,7 +1378,7 @@
           <a:p>
             <a:fld id="{4509A250-FF31-4206-8172-F9D3106AACB1}" type="datetimeFigureOut">
               <a:rPr lang="en-US" dirty="0"/>
-              <a:t>4/11/2016</a:t>
+              <a:t>4/13/2016</a:t>
             </a:fld>
             <a:endParaRPr lang="en-US" dirty="0"/>
           </a:p>
@@ -1976,7 +1996,7 @@
           <a:p>
             <a:fld id="{4509A250-FF31-4206-8172-F9D3106AACB1}" type="datetimeFigureOut">
               <a:rPr lang="en-US" dirty="0"/>
-              <a:t>4/11/2016</a:t>
+              <a:t>4/13/2016</a:t>
             </a:fld>
             <a:endParaRPr lang="en-US" dirty="0"/>
           </a:p>
@@ -2831,7 +2851,7 @@
           <a:p>
             <a:fld id="{4509A250-FF31-4206-8172-F9D3106AACB1}" type="datetimeFigureOut">
               <a:rPr lang="en-US" dirty="0"/>
-              <a:t>4/11/2016</a:t>
+              <a:t>4/13/2016</a:t>
             </a:fld>
             <a:endParaRPr lang="en-US" dirty="0"/>
           </a:p>
@@ -2996,7 +3016,7 @@
           <a:p>
             <a:fld id="{4509A250-FF31-4206-8172-F9D3106AACB1}" type="datetimeFigureOut">
               <a:rPr lang="en-US" dirty="0"/>
-              <a:t>4/11/2016</a:t>
+              <a:t>4/13/2016</a:t>
             </a:fld>
             <a:endParaRPr lang="en-US" dirty="0"/>
           </a:p>
@@ -3171,7 +3191,7 @@
           <a:p>
             <a:fld id="{4509A250-FF31-4206-8172-F9D3106AACB1}" type="datetimeFigureOut">
               <a:rPr lang="en-US" dirty="0"/>
-              <a:t>4/11/2016</a:t>
+              <a:t>4/13/2016</a:t>
             </a:fld>
             <a:endParaRPr lang="en-US" dirty="0"/>
           </a:p>
@@ -3336,7 +3356,7 @@
           <a:p>
             <a:fld id="{4509A250-FF31-4206-8172-F9D3106AACB1}" type="datetimeFigureOut">
               <a:rPr lang="en-US" dirty="0"/>
-              <a:t>4/11/2016</a:t>
+              <a:t>4/13/2016</a:t>
             </a:fld>
             <a:endParaRPr lang="en-US" dirty="0"/>
           </a:p>
@@ -3578,7 +3598,7 @@
           <a:p>
             <a:fld id="{9796027F-7875-4030-9381-8BD8C4F21935}" type="datetimeFigureOut">
               <a:rPr lang="en-US" dirty="0"/>
-              <a:t>4/11/2016</a:t>
+              <a:t>4/13/2016</a:t>
             </a:fld>
             <a:endParaRPr lang="en-US" dirty="0"/>
           </a:p>
@@ -3865,7 +3885,7 @@
           <a:p>
             <a:fld id="{9796027F-7875-4030-9381-8BD8C4F21935}" type="datetimeFigureOut">
               <a:rPr lang="en-US" dirty="0"/>
-              <a:t>4/11/2016</a:t>
+              <a:t>4/13/2016</a:t>
             </a:fld>
             <a:endParaRPr lang="en-US" dirty="0"/>
           </a:p>
@@ -4304,7 +4324,7 @@
           <a:p>
             <a:fld id="{9796027F-7875-4030-9381-8BD8C4F21935}" type="datetimeFigureOut">
               <a:rPr lang="en-US" dirty="0"/>
-              <a:t>4/11/2016</a:t>
+              <a:t>4/13/2016</a:t>
             </a:fld>
             <a:endParaRPr lang="en-US" dirty="0"/>
           </a:p>
@@ -4417,7 +4437,7 @@
           <a:p>
             <a:fld id="{4509A250-FF31-4206-8172-F9D3106AACB1}" type="datetimeFigureOut">
               <a:rPr lang="en-US" dirty="0"/>
-              <a:t>4/11/2016</a:t>
+              <a:t>4/13/2016</a:t>
             </a:fld>
             <a:endParaRPr lang="en-US" dirty="0"/>
           </a:p>
@@ -4507,7 +4527,7 @@
           <a:p>
             <a:fld id="{4509A250-FF31-4206-8172-F9D3106AACB1}" type="datetimeFigureOut">
               <a:rPr lang="en-US" dirty="0"/>
-              <a:t>4/11/2016</a:t>
+              <a:t>4/13/2016</a:t>
             </a:fld>
             <a:endParaRPr lang="en-US" dirty="0"/>
           </a:p>
@@ -4781,7 +4801,7 @@
           <a:p>
             <a:fld id="{4509A250-FF31-4206-8172-F9D3106AACB1}" type="datetimeFigureOut">
               <a:rPr lang="en-US" dirty="0"/>
-              <a:t>4/11/2016</a:t>
+              <a:t>4/13/2016</a:t>
             </a:fld>
             <a:endParaRPr lang="en-US" dirty="0"/>
           </a:p>
@@ -5051,7 +5071,7 @@
           <a:p>
             <a:fld id="{4509A250-FF31-4206-8172-F9D3106AACB1}" type="datetimeFigureOut">
               <a:rPr lang="en-US" dirty="0"/>
-              <a:t>4/11/2016</a:t>
+              <a:t>4/13/2016</a:t>
             </a:fld>
             <a:endParaRPr lang="en-US" dirty="0"/>
           </a:p>
@@ -5475,7 +5495,7 @@
           <a:p>
             <a:fld id="{4AAD347D-5ACD-4C99-B74B-A9C85AD731AF}" type="datetimeFigureOut">
               <a:rPr lang="en-US" dirty="0"/>
-              <a:t>4/11/2016</a:t>
+              <a:t>4/13/2016</a:t>
             </a:fld>
             <a:endParaRPr lang="en-US" dirty="0"/>
           </a:p>
@@ -6185,6 +6205,10 @@
               <a:t>. To connect the database to our front-end site, we are using </a:t>
             </a:r>
             <a:r>
+              <a:rPr lang="en-US" dirty="0" smtClean="0"/>
+              <a:t>client and server-side JavaScript with HTTP requests</a:t>
+            </a:r>
+            <a:r>
               <a:rPr lang="en-US" dirty="0" smtClean="0">
                 <a:solidFill>
                   <a:schemeClr val="accent2">
@@ -6193,7 +6217,7 @@
                   </a:schemeClr>
                 </a:solidFill>
               </a:rPr>
-              <a:t>PHP.</a:t>
+              <a:t>.</a:t>
             </a:r>
             <a:endParaRPr lang="en-US" dirty="0"/>
           </a:p>
@@ -6420,6 +6444,161 @@
     <p:extLst>
       <p:ext uri="{BB962C8B-B14F-4D97-AF65-F5344CB8AC3E}">
         <p14:creationId xmlns:p14="http://schemas.microsoft.com/office/powerpoint/2010/main" val="3385249708"/>
+      </p:ext>
+    </p:extLst>
+  </p:cSld>
+  <p:clrMapOvr>
+    <a:masterClrMapping/>
+  </p:clrMapOvr>
+</p:sld>
+</file>
+
+<file path=ppt/slides/slide4.xml><?xml version="1.0" encoding="utf-8"?>
+<p:sld xmlns:a="http://schemas.openxmlformats.org/drawingml/2006/main" xmlns:r="http://schemas.openxmlformats.org/officeDocument/2006/relationships" xmlns:p="http://schemas.openxmlformats.org/presentationml/2006/main">
+  <p:cSld>
+    <p:spTree>
+      <p:nvGrpSpPr>
+        <p:cNvPr id="1" name=""/>
+        <p:cNvGrpSpPr/>
+        <p:nvPr/>
+      </p:nvGrpSpPr>
+      <p:grpSpPr>
+        <a:xfrm>
+          <a:off x="0" y="0"/>
+          <a:ext cx="0" cy="0"/>
+          <a:chOff x="0" y="0"/>
+          <a:chExt cx="0" cy="0"/>
+        </a:xfrm>
+      </p:grpSpPr>
+      <p:sp>
+        <p:nvSpPr>
+          <p:cNvPr id="2" name="Title 1"/>
+          <p:cNvSpPr>
+            <a:spLocks noGrp="1"/>
+          </p:cNvSpPr>
+          <p:nvPr>
+            <p:ph type="title"/>
+          </p:nvPr>
+        </p:nvSpPr>
+        <p:spPr/>
+        <p:txBody>
+          <a:bodyPr/>
+          <a:lstStyle/>
+          <a:p>
+            <a:r>
+              <a:rPr lang="en-US" dirty="0" smtClean="0"/>
+              <a:t>Database Architecture/EER Model</a:t>
+            </a:r>
+            <a:endParaRPr lang="en-US" dirty="0"/>
+          </a:p>
+        </p:txBody>
+      </p:sp>
+      <p:pic>
+        <p:nvPicPr>
+          <p:cNvPr id="4" name="Picture 3"/>
+          <p:cNvPicPr>
+            <a:picLocks noChangeAspect="1"/>
+          </p:cNvPicPr>
+          <p:nvPr/>
+        </p:nvPicPr>
+        <p:blipFill>
+          <a:blip r:embed="rId2"/>
+          <a:stretch>
+            <a:fillRect/>
+          </a:stretch>
+        </p:blipFill>
+        <p:spPr>
+          <a:xfrm>
+            <a:off x="2562045" y="1723666"/>
+            <a:ext cx="6480145" cy="4090457"/>
+          </a:xfrm>
+          <a:prstGeom prst="rect">
+            <a:avLst/>
+          </a:prstGeom>
+        </p:spPr>
+      </p:pic>
+    </p:spTree>
+    <p:extLst>
+      <p:ext uri="{BB962C8B-B14F-4D97-AF65-F5344CB8AC3E}">
+        <p14:creationId xmlns:p14="http://schemas.microsoft.com/office/powerpoint/2010/main" val="4055263851"/>
+      </p:ext>
+    </p:extLst>
+  </p:cSld>
+  <p:clrMapOvr>
+    <a:masterClrMapping/>
+  </p:clrMapOvr>
+</p:sld>
+</file>
+
+<file path=ppt/slides/slide5.xml><?xml version="1.0" encoding="utf-8"?>
+<p:sld xmlns:a="http://schemas.openxmlformats.org/drawingml/2006/main" xmlns:r="http://schemas.openxmlformats.org/officeDocument/2006/relationships" xmlns:p="http://schemas.openxmlformats.org/presentationml/2006/main">
+  <p:cSld>
+    <p:spTree>
+      <p:nvGrpSpPr>
+        <p:cNvPr id="1" name=""/>
+        <p:cNvGrpSpPr/>
+        <p:nvPr/>
+      </p:nvGrpSpPr>
+      <p:grpSpPr>
+        <a:xfrm>
+          <a:off x="0" y="0"/>
+          <a:ext cx="0" cy="0"/>
+          <a:chOff x="0" y="0"/>
+          <a:chExt cx="0" cy="0"/>
+        </a:xfrm>
+      </p:grpSpPr>
+      <p:sp>
+        <p:nvSpPr>
+          <p:cNvPr id="2" name="Title 1"/>
+          <p:cNvSpPr>
+            <a:spLocks noGrp="1"/>
+          </p:cNvSpPr>
+          <p:nvPr>
+            <p:ph type="title"/>
+          </p:nvPr>
+        </p:nvSpPr>
+        <p:spPr/>
+        <p:txBody>
+          <a:bodyPr/>
+          <a:lstStyle/>
+          <a:p>
+            <a:r>
+              <a:rPr lang="en-US" dirty="0" smtClean="0"/>
+              <a:t>Short Demonstration</a:t>
+            </a:r>
+            <a:endParaRPr lang="en-US" dirty="0"/>
+          </a:p>
+        </p:txBody>
+      </p:sp>
+      <p:sp>
+        <p:nvSpPr>
+          <p:cNvPr id="3" name="Content Placeholder 2"/>
+          <p:cNvSpPr>
+            <a:spLocks noGrp="1"/>
+          </p:cNvSpPr>
+          <p:nvPr>
+            <p:ph idx="1"/>
+          </p:nvPr>
+        </p:nvSpPr>
+        <p:spPr/>
+        <p:txBody>
+          <a:bodyPr/>
+          <a:lstStyle/>
+          <a:p>
+            <a:r>
+              <a:rPr lang="en-US" dirty="0" smtClean="0"/>
+              <a:t>Thanks!</a:t>
+            </a:r>
+          </a:p>
+          <a:p>
+            <a:endParaRPr lang="en-US" dirty="0"/>
+          </a:p>
+        </p:txBody>
+      </p:sp>
+    </p:spTree>
+    <p:extLst>
+      <p:ext uri="{BB962C8B-B14F-4D97-AF65-F5344CB8AC3E}">
+        <p14:creationId xmlns:p14="http://schemas.microsoft.com/office/powerpoint/2010/main" val="2386643761"/>
       </p:ext>
     </p:extLst>
   </p:cSld>

</xml_diff>